<commit_message>
Added the Wow Factor section
</commit_message>
<xml_diff>
--- a/DEMO3/DEMO3.pptx
+++ b/DEMO3/DEMO3.pptx
@@ -5,12 +5,13 @@
     <p:sldMasterId id="2147483648" r:id="rId1"/>
   </p:sldMasterIdLst>
   <p:notesMasterIdLst>
-    <p:notesMasterId r:id="rId5"/>
+    <p:notesMasterId r:id="rId6"/>
   </p:notesMasterIdLst>
   <p:sldIdLst>
     <p:sldId id="256" r:id="rId2"/>
     <p:sldId id="257" r:id="rId3"/>
     <p:sldId id="258" r:id="rId4"/>
+    <p:sldId id="259" r:id="rId5"/>
   </p:sldIdLst>
   <p:sldSz cx="12192000" cy="6858000"/>
   <p:notesSz cx="6858000" cy="9144000"/>
@@ -109,6 +110,11 @@
       </a:defRPr>
     </a:lvl9pPr>
   </p:defaultTextStyle>
+  <p:extLst>
+    <p:ext uri="{EFAFB233-063F-42B5-8137-9DF3F51BA10A}">
+      <p15:sldGuideLst xmlns:p15="http://schemas.microsoft.com/office/powerpoint/2012/main"/>
+    </p:ext>
+  </p:extLst>
 </p:presentation>
 </file>
 
@@ -194,7 +200,7 @@
           <a:p>
             <a:fld id="{91CC9A1E-4585-4A57-98BC-907814C54D88}" type="datetimeFigureOut">
               <a:rPr lang="en-ZA" smtClean="0"/>
-              <a:t>2016/09/08</a:t>
+              <a:t>2016/09/09</a:t>
             </a:fld>
             <a:endParaRPr lang="en-ZA"/>
           </a:p>
@@ -546,6 +552,90 @@
 </p:notes>
 </file>
 
+<file path=ppt/notesSlides/notesSlide2.xml><?xml version="1.0" encoding="utf-8"?>
+<p:notes xmlns:a="http://schemas.openxmlformats.org/drawingml/2006/main" xmlns:r="http://schemas.openxmlformats.org/officeDocument/2006/relationships" xmlns:p="http://schemas.openxmlformats.org/presentationml/2006/main">
+  <p:cSld>
+    <p:spTree>
+      <p:nvGrpSpPr>
+        <p:cNvPr id="1" name=""/>
+        <p:cNvGrpSpPr/>
+        <p:nvPr/>
+      </p:nvGrpSpPr>
+      <p:grpSpPr>
+        <a:xfrm>
+          <a:off x="0" y="0"/>
+          <a:ext cx="0" cy="0"/>
+          <a:chOff x="0" y="0"/>
+          <a:chExt cx="0" cy="0"/>
+        </a:xfrm>
+      </p:grpSpPr>
+      <p:sp>
+        <p:nvSpPr>
+          <p:cNvPr id="2" name="Slide Image Placeholder 1"/>
+          <p:cNvSpPr>
+            <a:spLocks noGrp="1" noRot="1" noChangeAspect="1"/>
+          </p:cNvSpPr>
+          <p:nvPr>
+            <p:ph type="sldImg"/>
+          </p:nvPr>
+        </p:nvSpPr>
+        <p:spPr/>
+      </p:sp>
+      <p:sp>
+        <p:nvSpPr>
+          <p:cNvPr id="3" name="Notes Placeholder 2"/>
+          <p:cNvSpPr>
+            <a:spLocks noGrp="1"/>
+          </p:cNvSpPr>
+          <p:nvPr>
+            <p:ph type="body" idx="1"/>
+          </p:nvPr>
+        </p:nvSpPr>
+        <p:spPr/>
+        <p:txBody>
+          <a:bodyPr/>
+          <a:lstStyle/>
+          <a:p>
+            <a:endParaRPr lang="en-US" dirty="0"/>
+          </a:p>
+        </p:txBody>
+      </p:sp>
+      <p:sp>
+        <p:nvSpPr>
+          <p:cNvPr id="4" name="Slide Number Placeholder 3"/>
+          <p:cNvSpPr>
+            <a:spLocks noGrp="1"/>
+          </p:cNvSpPr>
+          <p:nvPr>
+            <p:ph type="sldNum" sz="quarter" idx="10"/>
+          </p:nvPr>
+        </p:nvSpPr>
+        <p:spPr/>
+        <p:txBody>
+          <a:bodyPr/>
+          <a:lstStyle/>
+          <a:p>
+            <a:fld id="{2DE1A68C-CE9C-4215-AA98-6C4C3F5594D0}" type="slidenum">
+              <a:rPr lang="en-ZA" smtClean="0"/>
+              <a:t>4</a:t>
+            </a:fld>
+            <a:endParaRPr lang="en-ZA"/>
+          </a:p>
+        </p:txBody>
+      </p:sp>
+    </p:spTree>
+    <p:extLst>
+      <p:ext uri="{BB962C8B-B14F-4D97-AF65-F5344CB8AC3E}">
+        <p14:creationId xmlns:p14="http://schemas.microsoft.com/office/powerpoint/2010/main" val="2170290444"/>
+      </p:ext>
+    </p:extLst>
+  </p:cSld>
+  <p:clrMapOvr>
+    <a:masterClrMapping/>
+  </p:clrMapOvr>
+</p:notes>
+</file>
+
 <file path=ppt/slideLayouts/slideLayout1.xml><?xml version="1.0" encoding="utf-8"?>
 <p:sldLayout xmlns:a="http://schemas.openxmlformats.org/drawingml/2006/main" xmlns:r="http://schemas.openxmlformats.org/officeDocument/2006/relationships" xmlns:p="http://schemas.openxmlformats.org/presentationml/2006/main" showMasterSp="0" type="title" preserve="1">
   <p:cSld name="Title Slide">
@@ -999,7 +1089,7 @@
           <a:p>
             <a:fld id="{F7AFFB9B-9FB8-469E-96F9-4D32314110B6}" type="datetimeFigureOut">
               <a:rPr lang="en-US" dirty="0"/>
-              <a:t>9/8/2016</a:t>
+              <a:t>09-Sep-16</a:t>
             </a:fld>
             <a:endParaRPr lang="en-US" dirty="0"/>
           </a:p>
@@ -1327,7 +1417,7 @@
           <a:p>
             <a:fld id="{341D2AC3-6A0B-4169-B1EA-E3AE8B351BDD}" type="datetimeFigureOut">
               <a:rPr lang="en-US" dirty="0"/>
-              <a:t>9/8/2016</a:t>
+              <a:t>09-Sep-16</a:t>
             </a:fld>
             <a:endParaRPr lang="en-US" dirty="0"/>
           </a:p>
@@ -1518,7 +1608,7 @@
           <a:p>
             <a:fld id="{DD4B9363-8B87-41B7-9F8E-64519CBB8F34}" type="datetimeFigureOut">
               <a:rPr lang="en-US" dirty="0"/>
-              <a:t>9/8/2016</a:t>
+              <a:t>09-Sep-16</a:t>
             </a:fld>
             <a:endParaRPr lang="en-US" dirty="0"/>
           </a:p>
@@ -1783,7 +1873,7 @@
           <a:p>
             <a:fld id="{EAEF5746-5284-4951-9F37-7AE924EDBCB7}" type="datetimeFigureOut">
               <a:rPr lang="en-US" dirty="0"/>
-              <a:t>9/8/2016</a:t>
+              <a:t>09-Sep-16</a:t>
             </a:fld>
             <a:endParaRPr lang="en-US" dirty="0"/>
           </a:p>
@@ -2206,7 +2296,7 @@
           <a:p>
             <a:fld id="{02398B29-7265-4A65-A2A4-6703C057B7C1}" type="datetimeFigureOut">
               <a:rPr lang="en-US" dirty="0"/>
-              <a:t>9/8/2016</a:t>
+              <a:t>09-Sep-16</a:t>
             </a:fld>
             <a:endParaRPr lang="en-US" dirty="0"/>
           </a:p>
@@ -2751,7 +2841,7 @@
           <a:p>
             <a:fld id="{28FBA082-94DF-4C4B-A041-6624924AB0A8}" type="datetimeFigureOut">
               <a:rPr lang="en-US" dirty="0"/>
-              <a:t>9/8/2016</a:t>
+              <a:t>09-Sep-16</a:t>
             </a:fld>
             <a:endParaRPr lang="en-US" dirty="0"/>
           </a:p>
@@ -3536,7 +3626,7 @@
           <a:p>
             <a:fld id="{B27686C4-3AB5-4E0C-86CA-FB108C350AA9}" type="datetimeFigureOut">
               <a:rPr lang="en-US" dirty="0"/>
-              <a:t>9/8/2016</a:t>
+              <a:t>09-Sep-16</a:t>
             </a:fld>
             <a:endParaRPr lang="en-US" dirty="0"/>
           </a:p>
@@ -3710,7 +3800,7 @@
           <a:p>
             <a:fld id="{49FF1211-4E0C-4AB3-B04F-585959BDAFE8}" type="datetimeFigureOut">
               <a:rPr lang="en-US" dirty="0"/>
-              <a:t>9/8/2016</a:t>
+              <a:t>09-Sep-16</a:t>
             </a:fld>
             <a:endParaRPr lang="en-US" dirty="0"/>
           </a:p>
@@ -3889,7 +3979,7 @@
           <a:p>
             <a:fld id="{28BDECAF-D3BE-4069-9C78-642ECCD01477}" type="datetimeFigureOut">
               <a:rPr lang="en-US" dirty="0"/>
-              <a:t>9/8/2016</a:t>
+              <a:t>09-Sep-16</a:t>
             </a:fld>
             <a:endParaRPr lang="en-US" dirty="0"/>
           </a:p>
@@ -4059,7 +4149,7 @@
           <a:p>
             <a:fld id="{8EFBDC27-E420-4878-9EE6-7B9656D6442A}" type="datetimeFigureOut">
               <a:rPr lang="en-US" dirty="0"/>
-              <a:t>9/8/2016</a:t>
+              <a:t>09-Sep-16</a:t>
             </a:fld>
             <a:endParaRPr lang="en-US" dirty="0"/>
           </a:p>
@@ -4304,7 +4394,7 @@
           <a:p>
             <a:fld id="{0F7F47CF-67C9-420C-80A5-E2069FF0C2DF}" type="datetimeFigureOut">
               <a:rPr lang="en-US" dirty="0"/>
-              <a:t>9/8/2016</a:t>
+              <a:t>09-Sep-16</a:t>
             </a:fld>
             <a:endParaRPr lang="en-US" dirty="0"/>
           </a:p>
@@ -4536,7 +4626,7 @@
           <a:p>
             <a:fld id="{AE22DC73-F065-42F5-A9F2-D90B2E42A0B3}" type="datetimeFigureOut">
               <a:rPr lang="en-US" dirty="0"/>
-              <a:t>9/8/2016</a:t>
+              <a:t>09-Sep-16</a:t>
             </a:fld>
             <a:endParaRPr lang="en-US" dirty="0"/>
           </a:p>
@@ -4916,7 +5006,7 @@
           <a:p>
             <a:fld id="{76BEA702-9B29-41CC-9BCC-3DF8A0D379FE}" type="datetimeFigureOut">
               <a:rPr lang="en-US" dirty="0"/>
-              <a:t>9/8/2016</a:t>
+              <a:t>09-Sep-16</a:t>
             </a:fld>
             <a:endParaRPr lang="en-US" dirty="0"/>
           </a:p>
@@ -5029,7 +5119,7 @@
           <a:p>
             <a:fld id="{097649AC-CB8F-4FF1-9A34-5861C74DD0A7}" type="datetimeFigureOut">
               <a:rPr lang="en-US" dirty="0"/>
-              <a:t>9/8/2016</a:t>
+              <a:t>09-Sep-16</a:t>
             </a:fld>
             <a:endParaRPr lang="en-US" dirty="0"/>
           </a:p>
@@ -5119,7 +5209,7 @@
           <a:p>
             <a:fld id="{3EC5CECA-2D3A-4680-9B49-752200DE467C}" type="datetimeFigureOut">
               <a:rPr lang="en-US" dirty="0"/>
-              <a:t>9/8/2016</a:t>
+              <a:t>09-Sep-16</a:t>
             </a:fld>
             <a:endParaRPr lang="en-US" dirty="0"/>
           </a:p>
@@ -5367,7 +5457,7 @@
           <a:p>
             <a:fld id="{50C3BFE2-83B7-4B0A-B9D3-AB28331082B3}" type="datetimeFigureOut">
               <a:rPr lang="en-US" dirty="0"/>
-              <a:t>9/8/2016</a:t>
+              <a:t>09-Sep-16</a:t>
             </a:fld>
             <a:endParaRPr lang="en-US" dirty="0"/>
           </a:p>
@@ -5631,7 +5721,7 @@
           <a:p>
             <a:fld id="{12EF78E3-FDA3-4D28-AAA2-0B81F349A39D}" type="datetimeFigureOut">
               <a:rPr lang="en-US" dirty="0"/>
-              <a:t>9/8/2016</a:t>
+              <a:t>09-Sep-16</a:t>
             </a:fld>
             <a:endParaRPr lang="en-US" dirty="0"/>
           </a:p>
@@ -6029,7 +6119,7 @@
           <a:p>
             <a:fld id="{C35BB1C6-BF8F-4481-8AB2-603A1C8A906A}" type="datetimeFigureOut">
               <a:rPr lang="en-US" dirty="0"/>
-              <a:t>9/8/2016</a:t>
+              <a:t>09-Sep-16</a:t>
             </a:fld>
             <a:endParaRPr lang="en-US" dirty="0"/>
           </a:p>
@@ -6620,9 +6710,9 @@
           </a:bodyPr>
           <a:lstStyle/>
           <a:p>
-            <a:pPr marL="457200" indent="-457200">
+            <a:pPr marL="571500" indent="-571500">
               <a:buFont typeface="Wingdings" panose="05000000000000000000" pitchFamily="2" charset="2"/>
-              <a:buChar char="q"/>
+              <a:buChar char="ü"/>
             </a:pPr>
             <a:r>
               <a:rPr lang="en-ZA" sz="3600" dirty="0">
@@ -6635,9 +6725,9 @@
             </a:endParaRPr>
           </a:p>
           <a:p>
-            <a:pPr marL="457200" indent="-457200">
+            <a:pPr marL="571500" indent="-571500">
               <a:buFont typeface="Wingdings" panose="05000000000000000000" pitchFamily="2" charset="2"/>
-              <a:buChar char="q"/>
+              <a:buChar char="ü"/>
             </a:pPr>
             <a:r>
               <a:rPr lang="en-ZA" sz="3600" dirty="0" smtClean="0">
@@ -6680,9 +6770,9 @@
             </a:endParaRPr>
           </a:p>
           <a:p>
-            <a:pPr marL="457200" indent="-457200">
+            <a:pPr marL="571500" indent="-571500">
               <a:buFont typeface="Wingdings" panose="05000000000000000000" pitchFamily="2" charset="2"/>
-              <a:buChar char="q"/>
+              <a:buChar char="ü"/>
             </a:pPr>
             <a:r>
               <a:rPr lang="en-ZA" sz="3600" dirty="0" smtClean="0">
@@ -6720,9 +6810,6 @@
               </a:rPr>
               <a:t>on the users’ portfolio. </a:t>
             </a:r>
-            <a:endParaRPr lang="en-ZA" sz="3600" dirty="0">
-              <a:latin typeface="Arial Narrow" panose="020B0606020202030204" pitchFamily="34" charset="0"/>
-            </a:endParaRPr>
           </a:p>
         </p:txBody>
       </p:sp>
@@ -6802,7 +6889,7 @@
         <p:spPr>
           <a:xfrm>
             <a:off x="685801" y="2137893"/>
-            <a:ext cx="10953383" cy="3108543"/>
+            <a:ext cx="11280396" cy="3108543"/>
           </a:xfrm>
           <a:prstGeom prst="rect">
             <a:avLst/>
@@ -6835,17 +6922,8 @@
               <a:rPr lang="en-US" sz="2800" dirty="0" smtClean="0">
                 <a:latin typeface="Arial Narrow" panose="020B0606020202030204" pitchFamily="34" charset="0"/>
               </a:rPr>
-              <a:t>Implemented session management using local </a:t>
-            </a:r>
-            <a:r>
-              <a:rPr lang="en-US" sz="2800" smtClean="0">
-                <a:latin typeface="Arial Narrow" panose="020B0606020202030204" pitchFamily="34" charset="0"/>
-              </a:rPr>
-              <a:t>storage in JavaScript</a:t>
-            </a:r>
-            <a:endParaRPr lang="en-US" sz="2800" dirty="0" smtClean="0">
-              <a:latin typeface="Arial Narrow" panose="020B0606020202030204" pitchFamily="34" charset="0"/>
-            </a:endParaRPr>
+              <a:t>Implemented session management using local storage in JavaScript</a:t>
+            </a:r>
           </a:p>
           <a:p>
             <a:pPr marL="285750" indent="-285750">
@@ -6892,7 +6970,19 @@
               <a:rPr lang="en-US" sz="2800" dirty="0" smtClean="0">
                 <a:latin typeface="Arial Narrow" panose="020B0606020202030204" pitchFamily="34" charset="0"/>
               </a:rPr>
-              <a:t> We came up with a formulae to calculate the net present value which is need to </a:t>
+              <a:t> We came up with a formulae to calculate the net present value which is </a:t>
+            </a:r>
+            <a:r>
+              <a:rPr lang="en-US" sz="2800" dirty="0" smtClean="0">
+                <a:latin typeface="Arial Narrow" panose="020B0606020202030204" pitchFamily="34" charset="0"/>
+              </a:rPr>
+              <a:t>needed </a:t>
+            </a:r>
+            <a:r>
+              <a:rPr lang="en-US" sz="2800" dirty="0" smtClean="0">
+                <a:latin typeface="Arial Narrow" panose="020B0606020202030204" pitchFamily="34" charset="0"/>
+              </a:rPr>
+              <a:t>to </a:t>
             </a:r>
           </a:p>
           <a:p>
@@ -6925,6 +7015,154 @@
       </p:par>
     </p:tnLst>
   </p:timing>
+</p:sld>
+</file>
+
+<file path=ppt/slides/slide4.xml><?xml version="1.0" encoding="utf-8"?>
+<p:sld xmlns:a="http://schemas.openxmlformats.org/drawingml/2006/main" xmlns:r="http://schemas.openxmlformats.org/officeDocument/2006/relationships" xmlns:p="http://schemas.openxmlformats.org/presentationml/2006/main">
+  <p:cSld>
+    <p:spTree>
+      <p:nvGrpSpPr>
+        <p:cNvPr id="1" name=""/>
+        <p:cNvGrpSpPr/>
+        <p:nvPr/>
+      </p:nvGrpSpPr>
+      <p:grpSpPr>
+        <a:xfrm>
+          <a:off x="0" y="0"/>
+          <a:ext cx="0" cy="0"/>
+          <a:chOff x="0" y="0"/>
+          <a:chExt cx="0" cy="0"/>
+        </a:xfrm>
+      </p:grpSpPr>
+      <p:sp>
+        <p:nvSpPr>
+          <p:cNvPr id="2" name="Title 1"/>
+          <p:cNvSpPr>
+            <a:spLocks noGrp="1"/>
+          </p:cNvSpPr>
+          <p:nvPr>
+            <p:ph type="title"/>
+          </p:nvPr>
+        </p:nvSpPr>
+        <p:spPr/>
+        <p:txBody>
+          <a:bodyPr/>
+          <a:lstStyle/>
+          <a:p>
+            <a:r>
+              <a:rPr lang="en-US" dirty="0" smtClean="0"/>
+              <a:t>Our wow factor</a:t>
+            </a:r>
+            <a:endParaRPr lang="en-US" dirty="0"/>
+          </a:p>
+        </p:txBody>
+      </p:sp>
+      <p:sp>
+        <p:nvSpPr>
+          <p:cNvPr id="6" name="TextBox 5"/>
+          <p:cNvSpPr txBox="1"/>
+          <p:nvPr/>
+        </p:nvSpPr>
+        <p:spPr>
+          <a:xfrm>
+            <a:off x="643502" y="1578457"/>
+            <a:ext cx="10481480" cy="3970318"/>
+          </a:xfrm>
+          <a:prstGeom prst="rect">
+            <a:avLst/>
+          </a:prstGeom>
+          <a:noFill/>
+        </p:spPr>
+        <p:txBody>
+          <a:bodyPr wrap="square" rtlCol="0">
+            <a:spAutoFit/>
+          </a:bodyPr>
+          <a:lstStyle/>
+          <a:p>
+            <a:pPr marL="285750" indent="-285750">
+              <a:buFont typeface="Wingdings" panose="05000000000000000000" pitchFamily="2" charset="2"/>
+              <a:buChar char="ü"/>
+            </a:pPr>
+            <a:r>
+              <a:rPr lang="en-US" sz="2800" dirty="0" smtClean="0">
+                <a:latin typeface="Arial Narrow" panose="020B0606020202030204" pitchFamily="34" charset="0"/>
+              </a:rPr>
+              <a:t>We are planning on using a Particle Swarm Optimization algorithm to optimize the Return On Investment calculation</a:t>
+            </a:r>
+          </a:p>
+          <a:p>
+            <a:pPr marL="285750" indent="-285750">
+              <a:buFont typeface="Wingdings" panose="05000000000000000000" pitchFamily="2" charset="2"/>
+              <a:buChar char="ü"/>
+            </a:pPr>
+            <a:r>
+              <a:rPr lang="en-US" sz="2800" dirty="0" smtClean="0">
+                <a:latin typeface="Arial Narrow" panose="020B0606020202030204" pitchFamily="34" charset="0"/>
+              </a:rPr>
+              <a:t>This Artificial </a:t>
+            </a:r>
+            <a:r>
+              <a:rPr lang="en-US" sz="2800" smtClean="0">
+                <a:latin typeface="Arial Narrow" panose="020B0606020202030204" pitchFamily="34" charset="0"/>
+              </a:rPr>
+              <a:t>Intelligence algorithm </a:t>
+            </a:r>
+            <a:r>
+              <a:rPr lang="en-US" sz="2800" dirty="0" smtClean="0">
+                <a:latin typeface="Arial Narrow" panose="020B0606020202030204" pitchFamily="34" charset="0"/>
+              </a:rPr>
+              <a:t>will be combined with a Hill Climbing algorithm</a:t>
+            </a:r>
+            <a:r>
+              <a:rPr lang="en-US" sz="2800" dirty="0">
+                <a:latin typeface="Arial Narrow" panose="020B0606020202030204" pitchFamily="34" charset="0"/>
+              </a:rPr>
+              <a:t> </a:t>
+            </a:r>
+            <a:r>
+              <a:rPr lang="en-US" sz="2800" dirty="0" smtClean="0">
+                <a:latin typeface="Arial Narrow" panose="020B0606020202030204" pitchFamily="34" charset="0"/>
+              </a:rPr>
+              <a:t>to maximize its accuracy</a:t>
+            </a:r>
+          </a:p>
+          <a:p>
+            <a:pPr marL="285750" indent="-285750">
+              <a:buFont typeface="Wingdings" panose="05000000000000000000" pitchFamily="2" charset="2"/>
+              <a:buChar char="ü"/>
+            </a:pPr>
+            <a:r>
+              <a:rPr lang="en-US" sz="2800" dirty="0" smtClean="0">
+                <a:latin typeface="Arial Narrow" panose="020B0606020202030204" pitchFamily="34" charset="0"/>
+              </a:rPr>
+              <a:t>The values retrieved from the user will be placed in the algorithm and optimized using a local optima technique to ensure that the best values are chosen</a:t>
+            </a:r>
+          </a:p>
+          <a:p>
+            <a:pPr marL="285750" indent="-285750">
+              <a:buFont typeface="Wingdings" panose="05000000000000000000" pitchFamily="2" charset="2"/>
+              <a:buChar char="ü"/>
+            </a:pPr>
+            <a:r>
+              <a:rPr lang="en-US" sz="2800" dirty="0" smtClean="0">
+                <a:latin typeface="Arial Narrow" panose="020B0606020202030204" pitchFamily="34" charset="0"/>
+              </a:rPr>
+              <a:t>These values will then be used to calculate the Net Present Value which will produce an optimized Return On Investment result</a:t>
+            </a:r>
+          </a:p>
+        </p:txBody>
+      </p:sp>
+    </p:spTree>
+    <p:extLst>
+      <p:ext uri="{BB962C8B-B14F-4D97-AF65-F5344CB8AC3E}">
+        <p14:creationId xmlns:p14="http://schemas.microsoft.com/office/powerpoint/2010/main" val="2888525414"/>
+      </p:ext>
+    </p:extLst>
+  </p:cSld>
+  <p:clrMapOvr>
+    <a:masterClrMapping/>
+  </p:clrMapOvr>
 </p:sld>
 </file>
 

</xml_diff>

<commit_message>
Updated Demo 3 Presentation
</commit_message>
<xml_diff>
--- a/DEMO3/DEMO3.pptx
+++ b/DEMO3/DEMO3.pptx
@@ -5,13 +5,15 @@
     <p:sldMasterId id="2147483648" r:id="rId1"/>
   </p:sldMasterIdLst>
   <p:notesMasterIdLst>
-    <p:notesMasterId r:id="rId6"/>
+    <p:notesMasterId r:id="rId8"/>
   </p:notesMasterIdLst>
   <p:sldIdLst>
     <p:sldId id="256" r:id="rId2"/>
     <p:sldId id="257" r:id="rId3"/>
     <p:sldId id="258" r:id="rId4"/>
     <p:sldId id="259" r:id="rId5"/>
+    <p:sldId id="260" r:id="rId6"/>
+    <p:sldId id="261" r:id="rId7"/>
   </p:sldIdLst>
   <p:sldSz cx="12192000" cy="6858000"/>
   <p:notesSz cx="6858000" cy="9144000"/>
@@ -6970,19 +6972,19 @@
               <a:rPr lang="en-US" sz="2800" dirty="0" smtClean="0">
                 <a:latin typeface="Arial Narrow" panose="020B0606020202030204" pitchFamily="34" charset="0"/>
               </a:rPr>
-              <a:t> We came up with a formulae to calculate the net present value which is </a:t>
+              <a:t> We came up with a </a:t>
             </a:r>
             <a:r>
               <a:rPr lang="en-US" sz="2800" dirty="0" smtClean="0">
                 <a:latin typeface="Arial Narrow" panose="020B0606020202030204" pitchFamily="34" charset="0"/>
               </a:rPr>
-              <a:t>needed </a:t>
+              <a:t>formula </a:t>
             </a:r>
             <a:r>
               <a:rPr lang="en-US" sz="2800" dirty="0" smtClean="0">
                 <a:latin typeface="Arial Narrow" panose="020B0606020202030204" pitchFamily="34" charset="0"/>
               </a:rPr>
-              <a:t>to </a:t>
+              <a:t>to calculate the net present value which is needed to </a:t>
             </a:r>
           </a:p>
           <a:p>
@@ -7163,6 +7165,135 @@
   <p:clrMapOvr>
     <a:masterClrMapping/>
   </p:clrMapOvr>
+  <p:timing>
+    <p:tnLst>
+      <p:par>
+        <p:cTn id="1" dur="indefinite" restart="never" nodeType="tmRoot"/>
+      </p:par>
+    </p:tnLst>
+  </p:timing>
+</p:sld>
+</file>
+
+<file path=ppt/slides/slide5.xml><?xml version="1.0" encoding="utf-8"?>
+<p:sld xmlns:a="http://schemas.openxmlformats.org/drawingml/2006/main" xmlns:r="http://schemas.openxmlformats.org/officeDocument/2006/relationships" xmlns:p="http://schemas.openxmlformats.org/presentationml/2006/main">
+  <p:cSld>
+    <p:spTree>
+      <p:nvGrpSpPr>
+        <p:cNvPr id="1" name=""/>
+        <p:cNvGrpSpPr/>
+        <p:nvPr/>
+      </p:nvGrpSpPr>
+      <p:grpSpPr>
+        <a:xfrm>
+          <a:off x="0" y="0"/>
+          <a:ext cx="0" cy="0"/>
+          <a:chOff x="0" y="0"/>
+          <a:chExt cx="0" cy="0"/>
+        </a:xfrm>
+      </p:grpSpPr>
+      <p:pic>
+        <p:nvPicPr>
+          <p:cNvPr id="2" name="Picture 1"/>
+          <p:cNvPicPr>
+            <a:picLocks noChangeAspect="1"/>
+          </p:cNvPicPr>
+          <p:nvPr/>
+        </p:nvPicPr>
+        <p:blipFill>
+          <a:blip r:embed="rId2"/>
+          <a:stretch>
+            <a:fillRect/>
+          </a:stretch>
+        </p:blipFill>
+        <p:spPr>
+          <a:xfrm>
+            <a:off x="-103239" y="-103238"/>
+            <a:ext cx="12295239" cy="6961238"/>
+          </a:xfrm>
+          <a:prstGeom prst="rect">
+            <a:avLst/>
+          </a:prstGeom>
+        </p:spPr>
+      </p:pic>
+    </p:spTree>
+    <p:extLst>
+      <p:ext uri="{BB962C8B-B14F-4D97-AF65-F5344CB8AC3E}">
+        <p14:creationId xmlns:p14="http://schemas.microsoft.com/office/powerpoint/2010/main" val="3183392470"/>
+      </p:ext>
+    </p:extLst>
+  </p:cSld>
+  <p:clrMapOvr>
+    <a:masterClrMapping/>
+  </p:clrMapOvr>
+  <p:timing>
+    <p:tnLst>
+      <p:par>
+        <p:cTn id="1" dur="indefinite" restart="never" nodeType="tmRoot"/>
+      </p:par>
+    </p:tnLst>
+  </p:timing>
+</p:sld>
+</file>
+
+<file path=ppt/slides/slide6.xml><?xml version="1.0" encoding="utf-8"?>
+<p:sld xmlns:a="http://schemas.openxmlformats.org/drawingml/2006/main" xmlns:r="http://schemas.openxmlformats.org/officeDocument/2006/relationships" xmlns:p="http://schemas.openxmlformats.org/presentationml/2006/main">
+  <p:cSld>
+    <p:spTree>
+      <p:nvGrpSpPr>
+        <p:cNvPr id="1" name=""/>
+        <p:cNvGrpSpPr/>
+        <p:nvPr/>
+      </p:nvGrpSpPr>
+      <p:grpSpPr>
+        <a:xfrm>
+          <a:off x="0" y="0"/>
+          <a:ext cx="0" cy="0"/>
+          <a:chOff x="0" y="0"/>
+          <a:chExt cx="0" cy="0"/>
+        </a:xfrm>
+      </p:grpSpPr>
+      <p:pic>
+        <p:nvPicPr>
+          <p:cNvPr id="2" name="Picture 1"/>
+          <p:cNvPicPr>
+            <a:picLocks noChangeAspect="1"/>
+          </p:cNvPicPr>
+          <p:nvPr/>
+        </p:nvPicPr>
+        <p:blipFill>
+          <a:blip r:embed="rId2"/>
+          <a:stretch>
+            <a:fillRect/>
+          </a:stretch>
+        </p:blipFill>
+        <p:spPr>
+          <a:xfrm>
+            <a:off x="0" y="1"/>
+            <a:ext cx="12192000" cy="6858000"/>
+          </a:xfrm>
+          <a:prstGeom prst="rect">
+            <a:avLst/>
+          </a:prstGeom>
+        </p:spPr>
+      </p:pic>
+    </p:spTree>
+    <p:extLst>
+      <p:ext uri="{BB962C8B-B14F-4D97-AF65-F5344CB8AC3E}">
+        <p14:creationId xmlns:p14="http://schemas.microsoft.com/office/powerpoint/2010/main" val="1137808673"/>
+      </p:ext>
+    </p:extLst>
+  </p:cSld>
+  <p:clrMapOvr>
+    <a:masterClrMapping/>
+  </p:clrMapOvr>
+  <p:timing>
+    <p:tnLst>
+      <p:par>
+        <p:cTn id="1" dur="indefinite" restart="never" nodeType="tmRoot"/>
+      </p:par>
+    </p:tnLst>
+  </p:timing>
 </p:sld>
 </file>
 

</xml_diff>